<commit_message>
fixed first diagram and added small explanation to 4
</commit_message>
<xml_diff>
--- a/diagram.pptx
+++ b/diagram.pptx
@@ -693,7 +693,7 @@
           <a:p>
             <a:fld id="{F11C8E6A-C2C3-42B2-9B6F-19EFF277C5DD}" type="datetimeFigureOut">
               <a:rPr lang="he-IL" smtClean="0"/>
-              <a:t>כ'/כסלו/תשפ"א</a:t>
+              <a:t>כ"ב/כסלו/תשפ"א</a:t>
             </a:fld>
             <a:endParaRPr lang="he-IL"/>
           </a:p>
@@ -893,7 +893,7 @@
           <a:p>
             <a:fld id="{F11C8E6A-C2C3-42B2-9B6F-19EFF277C5DD}" type="datetimeFigureOut">
               <a:rPr lang="he-IL" smtClean="0"/>
-              <a:t>כ'/כסלו/תשפ"א</a:t>
+              <a:t>כ"ב/כסלו/תשפ"א</a:t>
             </a:fld>
             <a:endParaRPr lang="he-IL"/>
           </a:p>
@@ -1103,7 +1103,7 @@
           <a:p>
             <a:fld id="{F11C8E6A-C2C3-42B2-9B6F-19EFF277C5DD}" type="datetimeFigureOut">
               <a:rPr lang="he-IL" smtClean="0"/>
-              <a:t>כ'/כסלו/תשפ"א</a:t>
+              <a:t>כ"ב/כסלו/תשפ"א</a:t>
             </a:fld>
             <a:endParaRPr lang="he-IL"/>
           </a:p>
@@ -1303,7 +1303,7 @@
           <a:p>
             <a:fld id="{F11C8E6A-C2C3-42B2-9B6F-19EFF277C5DD}" type="datetimeFigureOut">
               <a:rPr lang="he-IL" smtClean="0"/>
-              <a:t>כ'/כסלו/תשפ"א</a:t>
+              <a:t>כ"ב/כסלו/תשפ"א</a:t>
             </a:fld>
             <a:endParaRPr lang="he-IL"/>
           </a:p>
@@ -1579,7 +1579,7 @@
           <a:p>
             <a:fld id="{F11C8E6A-C2C3-42B2-9B6F-19EFF277C5DD}" type="datetimeFigureOut">
               <a:rPr lang="he-IL" smtClean="0"/>
-              <a:t>כ'/כסלו/תשפ"א</a:t>
+              <a:t>כ"ב/כסלו/תשפ"א</a:t>
             </a:fld>
             <a:endParaRPr lang="he-IL"/>
           </a:p>
@@ -1847,7 +1847,7 @@
           <a:p>
             <a:fld id="{F11C8E6A-C2C3-42B2-9B6F-19EFF277C5DD}" type="datetimeFigureOut">
               <a:rPr lang="he-IL" smtClean="0"/>
-              <a:t>כ'/כסלו/תשפ"א</a:t>
+              <a:t>כ"ב/כסלו/תשפ"א</a:t>
             </a:fld>
             <a:endParaRPr lang="he-IL"/>
           </a:p>
@@ -2262,7 +2262,7 @@
           <a:p>
             <a:fld id="{F11C8E6A-C2C3-42B2-9B6F-19EFF277C5DD}" type="datetimeFigureOut">
               <a:rPr lang="he-IL" smtClean="0"/>
-              <a:t>כ'/כסלו/תשפ"א</a:t>
+              <a:t>כ"ב/כסלו/תשפ"א</a:t>
             </a:fld>
             <a:endParaRPr lang="he-IL"/>
           </a:p>
@@ -2404,7 +2404,7 @@
           <a:p>
             <a:fld id="{F11C8E6A-C2C3-42B2-9B6F-19EFF277C5DD}" type="datetimeFigureOut">
               <a:rPr lang="he-IL" smtClean="0"/>
-              <a:t>כ'/כסלו/תשפ"א</a:t>
+              <a:t>כ"ב/כסלו/תשפ"א</a:t>
             </a:fld>
             <a:endParaRPr lang="he-IL"/>
           </a:p>
@@ -2517,7 +2517,7 @@
           <a:p>
             <a:fld id="{F11C8E6A-C2C3-42B2-9B6F-19EFF277C5DD}" type="datetimeFigureOut">
               <a:rPr lang="he-IL" smtClean="0"/>
-              <a:t>כ'/כסלו/תשפ"א</a:t>
+              <a:t>כ"ב/כסלו/תשפ"א</a:t>
             </a:fld>
             <a:endParaRPr lang="he-IL"/>
           </a:p>
@@ -2830,7 +2830,7 @@
           <a:p>
             <a:fld id="{F11C8E6A-C2C3-42B2-9B6F-19EFF277C5DD}" type="datetimeFigureOut">
               <a:rPr lang="he-IL" smtClean="0"/>
-              <a:t>כ'/כסלו/תשפ"א</a:t>
+              <a:t>כ"ב/כסלו/תשפ"א</a:t>
             </a:fld>
             <a:endParaRPr lang="he-IL"/>
           </a:p>
@@ -3119,7 +3119,7 @@
           <a:p>
             <a:fld id="{F11C8E6A-C2C3-42B2-9B6F-19EFF277C5DD}" type="datetimeFigureOut">
               <a:rPr lang="he-IL" smtClean="0"/>
-              <a:t>כ'/כסלו/תשפ"א</a:t>
+              <a:t>כ"ב/כסלו/תשפ"א</a:t>
             </a:fld>
             <a:endParaRPr lang="he-IL"/>
           </a:p>
@@ -3362,7 +3362,7 @@
           <a:p>
             <a:fld id="{F11C8E6A-C2C3-42B2-9B6F-19EFF277C5DD}" type="datetimeFigureOut">
               <a:rPr lang="he-IL" smtClean="0"/>
-              <a:t>כ'/כסלו/תשפ"א</a:t>
+              <a:t>כ"ב/כסלו/תשפ"א</a:t>
             </a:fld>
             <a:endParaRPr lang="he-IL"/>
           </a:p>
@@ -3966,7 +3966,7 @@
             </a:r>
             <a:r>
               <a:rPr lang="en-US" baseline="-25000" dirty="0"/>
-              <a:t>2</a:t>
+              <a:t>4</a:t>
             </a:r>
             <a:endParaRPr lang="en-US" dirty="0"/>
           </a:p>
@@ -4033,7 +4033,7 @@
             </a:r>
             <a:r>
               <a:rPr lang="en-US" baseline="-25000" dirty="0"/>
-              <a:t>5</a:t>
+              <a:t>3</a:t>
             </a:r>
             <a:endParaRPr lang="en-US" dirty="0"/>
           </a:p>
@@ -4167,7 +4167,7 @@
             </a:r>
             <a:r>
               <a:rPr lang="en-US" baseline="-25000" dirty="0"/>
-              <a:t>3</a:t>
+              <a:t>2</a:t>
             </a:r>
           </a:p>
           <a:p>
@@ -4233,7 +4233,7 @@
             </a:r>
             <a:r>
               <a:rPr lang="en-US" baseline="-25000" dirty="0"/>
-              <a:t>4</a:t>
+              <a:t>5</a:t>
             </a:r>
             <a:endParaRPr lang="en-US" dirty="0"/>
           </a:p>
@@ -8334,6 +8334,21 @@
 </file>
 
 <file path=customXml/item1.xml><?xml version="1.0" encoding="utf-8"?>
+<p:properties xmlns:p="http://schemas.microsoft.com/office/2006/metadata/properties" xmlns:xsi="http://www.w3.org/2001/XMLSchema-instance" xmlns:pc="http://schemas.microsoft.com/office/infopath/2007/PartnerControls">
+  <documentManagement/>
+</p:properties>
+</file>
+
+<file path=customXml/item2.xml><?xml version="1.0" encoding="utf-8"?>
+<?mso-contentType ?>
+<FormTemplates xmlns="http://schemas.microsoft.com/sharepoint/v3/contenttype/forms">
+  <Display>DocumentLibraryForm</Display>
+  <Edit>DocumentLibraryForm</Edit>
+  <New>DocumentLibraryForm</New>
+</FormTemplates>
+</file>
+
+<file path=customXml/item3.xml><?xml version="1.0" encoding="utf-8"?>
 <ct:contentTypeSchema xmlns:ct="http://schemas.microsoft.com/office/2006/metadata/contentType" xmlns:ma="http://schemas.microsoft.com/office/2006/metadata/properties/metaAttributes" ct:_="" ma:_="" ma:contentTypeName="Document" ma:contentTypeID="0x0101003012355D375B7040A25B0E2ED4505B42" ma:contentTypeVersion="6" ma:contentTypeDescription="Create a new document." ma:contentTypeScope="" ma:versionID="3dd2504b8d6553ae6c01d7778126904b">
   <xsd:schema xmlns:xsd="http://www.w3.org/2001/XMLSchema" xmlns:xs="http://www.w3.org/2001/XMLSchema" xmlns:p="http://schemas.microsoft.com/office/2006/metadata/properties" xmlns:ns3="72f75162-65f5-4d31-87b0-90b66f5c5264" targetNamespace="http://schemas.microsoft.com/office/2006/metadata/properties" ma:root="true" ma:fieldsID="34bb381a9e733b3bfd9718a514822784" ns3:_="">
     <xsd:import namespace="72f75162-65f5-4d31-87b0-90b66f5c5264"/>
@@ -8491,22 +8506,24 @@
 </ct:contentTypeSchema>
 </file>
 
-<file path=customXml/item2.xml><?xml version="1.0" encoding="utf-8"?>
-<?mso-contentType ?>
-<FormTemplates xmlns="http://schemas.microsoft.com/sharepoint/v3/contenttype/forms">
-  <Display>DocumentLibraryForm</Display>
-  <Edit>DocumentLibraryForm</Edit>
-  <New>DocumentLibraryForm</New>
-</FormTemplates>
+<file path=customXml/itemProps1.xml><?xml version="1.0" encoding="utf-8"?>
+<ds:datastoreItem xmlns:ds="http://schemas.openxmlformats.org/officeDocument/2006/customXml" ds:itemID="{1BFB3520-4466-4CF8-BF29-8298D04C1584}">
+  <ds:schemaRefs>
+    <ds:schemaRef ds:uri="http://schemas.microsoft.com/office/2006/metadata/properties"/>
+    <ds:schemaRef ds:uri="http://schemas.microsoft.com/office/infopath/2007/PartnerControls"/>
+  </ds:schemaRefs>
+</ds:datastoreItem>
 </file>
 
-<file path=customXml/item3.xml><?xml version="1.0" encoding="utf-8"?>
-<p:properties xmlns:p="http://schemas.microsoft.com/office/2006/metadata/properties" xmlns:xsi="http://www.w3.org/2001/XMLSchema-instance" xmlns:pc="http://schemas.microsoft.com/office/infopath/2007/PartnerControls">
-  <documentManagement/>
-</p:properties>
+<file path=customXml/itemProps2.xml><?xml version="1.0" encoding="utf-8"?>
+<ds:datastoreItem xmlns:ds="http://schemas.openxmlformats.org/officeDocument/2006/customXml" ds:itemID="{B01FBFE9-53C6-4CA9-848F-C081ECD5D22E}">
+  <ds:schemaRefs>
+    <ds:schemaRef ds:uri="http://schemas.microsoft.com/sharepoint/v3/contenttype/forms"/>
+  </ds:schemaRefs>
+</ds:datastoreItem>
 </file>
 
-<file path=customXml/itemProps1.xml><?xml version="1.0" encoding="utf-8"?>
+<file path=customXml/itemProps3.xml><?xml version="1.0" encoding="utf-8"?>
 <ds:datastoreItem xmlns:ds="http://schemas.openxmlformats.org/officeDocument/2006/customXml" ds:itemID="{426C6010-0F3B-4F81-9846-C8412AEB9DEA}">
   <ds:schemaRefs>
     <ds:schemaRef ds:uri="http://schemas.microsoft.com/office/2006/metadata/contentType"/>
@@ -8522,21 +8539,4 @@
     <ds:schemaRef ds:uri="http://schemas.microsoft.com/internal/obd"/>
   </ds:schemaRefs>
 </ds:datastoreItem>
-</file>
-
-<file path=customXml/itemProps2.xml><?xml version="1.0" encoding="utf-8"?>
-<ds:datastoreItem xmlns:ds="http://schemas.openxmlformats.org/officeDocument/2006/customXml" ds:itemID="{B01FBFE9-53C6-4CA9-848F-C081ECD5D22E}">
-  <ds:schemaRefs>
-    <ds:schemaRef ds:uri="http://schemas.microsoft.com/sharepoint/v3/contenttype/forms"/>
-  </ds:schemaRefs>
-</ds:datastoreItem>
-</file>
-
-<file path=customXml/itemProps3.xml><?xml version="1.0" encoding="utf-8"?>
-<ds:datastoreItem xmlns:ds="http://schemas.openxmlformats.org/officeDocument/2006/customXml" ds:itemID="{1BFB3520-4466-4CF8-BF29-8298D04C1584}">
-  <ds:schemaRefs>
-    <ds:schemaRef ds:uri="http://schemas.microsoft.com/office/2006/metadata/properties"/>
-    <ds:schemaRef ds:uri="http://schemas.microsoft.com/office/infopath/2007/PartnerControls"/>
-  </ds:schemaRefs>
-</ds:datastoreItem>
 </file>
</xml_diff>